<commit_message>
Added Github in development tool
</commit_message>
<xml_diff>
--- a/Document/Rotary Youth Drive Awareness Project.pptx
+++ b/Document/Rotary Youth Drive Awareness Project.pptx
@@ -592,7 +592,7 @@
           <a:p>
             <a:fld id="{128FCA9C-FF92-4024-BDEC-A6D3B663DC09}" type="datetimeFigureOut">
               <a:rPr lang="en-US"/>
-              <a:t>10/2/2017</a:t>
+              <a:t>10/3/2017</a:t>
             </a:fld>
             <a:endParaRPr/>
           </a:p>
@@ -757,7 +757,7 @@
           <a:p>
             <a:fld id="{772AB877-E7B1-4681-847E-D0918612832B}" type="datetimeFigureOut">
               <a:rPr lang="en-US"/>
-              <a:t>10/2/2017</a:t>
+              <a:t>10/3/2017</a:t>
             </a:fld>
             <a:endParaRPr/>
           </a:p>
@@ -36479,7 +36479,7 @@
           <a:p>
             <a:fld id="{EDF33987-6305-4E2A-BF18-EF013ECE927B}" type="datetimeFigureOut">
               <a:rPr lang="en-US"/>
-              <a:t>10/2/2017</a:t>
+              <a:t>10/3/2017</a:t>
             </a:fld>
             <a:endParaRPr/>
           </a:p>
@@ -36691,7 +36691,7 @@
           <a:p>
             <a:fld id="{EDF33987-6305-4E2A-BF18-EF013ECE927B}" type="datetimeFigureOut">
               <a:rPr lang="en-US"/>
-              <a:t>10/2/2017</a:t>
+              <a:t>10/3/2017</a:t>
             </a:fld>
             <a:endParaRPr/>
           </a:p>
@@ -36893,7 +36893,7 @@
           <a:p>
             <a:fld id="{EDF33987-6305-4E2A-BF18-EF013ECE927B}" type="datetimeFigureOut">
               <a:rPr lang="en-US"/>
-              <a:t>10/2/2017</a:t>
+              <a:t>10/3/2017</a:t>
             </a:fld>
             <a:endParaRPr/>
           </a:p>
@@ -37158,7 +37158,7 @@
           <a:p>
             <a:fld id="{EDF33987-6305-4E2A-BF18-EF013ECE927B}" type="datetimeFigureOut">
               <a:rPr lang="en-US"/>
-              <a:t>10/2/2017</a:t>
+              <a:t>10/3/2017</a:t>
             </a:fld>
             <a:endParaRPr/>
           </a:p>
@@ -37466,7 +37466,7 @@
           <a:p>
             <a:fld id="{EDF33987-6305-4E2A-BF18-EF013ECE927B}" type="datetimeFigureOut">
               <a:rPr lang="en-US"/>
-              <a:t>10/2/2017</a:t>
+              <a:t>10/3/2017</a:t>
             </a:fld>
             <a:endParaRPr/>
           </a:p>
@@ -37926,7 +37926,7 @@
           <a:p>
             <a:fld id="{EDF33987-6305-4E2A-BF18-EF013ECE927B}" type="datetimeFigureOut">
               <a:rPr lang="en-US"/>
-              <a:t>10/2/2017</a:t>
+              <a:t>10/3/2017</a:t>
             </a:fld>
             <a:endParaRPr/>
           </a:p>
@@ -38060,7 +38060,7 @@
           <a:p>
             <a:fld id="{EDF33987-6305-4E2A-BF18-EF013ECE927B}" type="datetimeFigureOut">
               <a:rPr lang="en-US"/>
-              <a:t>10/2/2017</a:t>
+              <a:t>10/3/2017</a:t>
             </a:fld>
             <a:endParaRPr/>
           </a:p>
@@ -38171,7 +38171,7 @@
           <a:p>
             <a:fld id="{EDF33987-6305-4E2A-BF18-EF013ECE927B}" type="datetimeFigureOut">
               <a:rPr lang="en-US"/>
-              <a:t>10/2/2017</a:t>
+              <a:t>10/3/2017</a:t>
             </a:fld>
             <a:endParaRPr/>
           </a:p>
@@ -38542,7 +38542,7 @@
           <a:p>
             <a:fld id="{EDF33987-6305-4E2A-BF18-EF013ECE927B}" type="datetimeFigureOut">
               <a:rPr lang="en-US"/>
-              <a:t>10/2/2017</a:t>
+              <a:t>10/3/2017</a:t>
             </a:fld>
             <a:endParaRPr/>
           </a:p>
@@ -38906,7 +38906,7 @@
           <a:p>
             <a:fld id="{EDF33987-6305-4E2A-BF18-EF013ECE927B}" type="datetimeFigureOut">
               <a:rPr lang="en-US"/>
-              <a:t>10/2/2017</a:t>
+              <a:t>10/3/2017</a:t>
             </a:fld>
             <a:endParaRPr/>
           </a:p>
@@ -39174,7 +39174,7 @@
             <a:fld id="{EDF33987-6305-4E2A-BF18-EF013ECE927B}" type="datetimeFigureOut">
               <a:rPr lang="en-US" smtClean="0"/>
               <a:pPr/>
-              <a:t>10/2/2017</a:t>
+              <a:t>10/3/2017</a:t>
             </a:fld>
             <a:endParaRPr lang="en-US"/>
           </a:p>
@@ -45454,8 +45454,13 @@
             </a:r>
             <a:r>
               <a:rPr lang="en-US" dirty="0"/>
-              <a:t> (IDE)</a:t>
+              <a:t> (IDE), </a:t>
             </a:r>
+            <a:r>
+              <a:rPr lang="en-US"/>
+              <a:t>Github</a:t>
+            </a:r>
+            <a:endParaRPr lang="en-US" dirty="0"/>
           </a:p>
           <a:p>
             <a:r>

</xml_diff>

<commit_message>
Implemented password encryption algorithm (SHA256- Cryptographic Hash Algorithm)
</commit_message>
<xml_diff>
--- a/Document/Rotary Youth Drive Awareness Project.pptx
+++ b/Document/Rotary Youth Drive Awareness Project.pptx
@@ -39606,7 +39606,15 @@
             <a:pPr algn="ctr"/>
             <a:r>
               <a:rPr lang="en-US" dirty="0"/>
-              <a:t>Rotary Youth Drive Awareness Project</a:t>
+              <a:t>Rotary </a:t>
+            </a:r>
+            <a:r>
+              <a:rPr lang="en-US"/>
+              <a:t>Youth Driving </a:t>
+            </a:r>
+            <a:r>
+              <a:rPr lang="en-US" dirty="0"/>
+              <a:t>Awareness Project</a:t>
             </a:r>
             <a:br>
               <a:rPr lang="en-US" dirty="0"/>

</xml_diff>